<commit_message>
updating flow, creating worksheet resources in parrallel
</commit_message>
<xml_diff>
--- a/Docs/Worksheet.pptx
+++ b/Docs/Worksheet.pptx
@@ -219,9 +219,6 @@
       </pc:sldChg>
     </pc:docChg>
   </pc:docChgLst>
-  <pc:docChgLst>
-    <pc:chgData name="Teresa Binks" userId="a2738410-2879-48a2-8c35-a24676bdb606" providerId="ADAL" clId="{F766F0A2-B746-4830-B174-4B8640DC1919}"/>
-  </pc:docChgLst>
 </pc:chgInfo>
 </file>
 
@@ -356,7 +353,7 @@
           <a:p>
             <a:fld id="{5683A812-56E3-43DB-839C-3C26450B3226}" type="datetimeFigureOut">
               <a:rPr lang="en-GB" smtClean="0"/>
-              <a:t>16/06/2019</a:t>
+              <a:t>29/11/2020</a:t>
             </a:fld>
             <a:endParaRPr lang="en-GB"/>
           </a:p>
@@ -526,7 +523,7 @@
           <a:p>
             <a:fld id="{5683A812-56E3-43DB-839C-3C26450B3226}" type="datetimeFigureOut">
               <a:rPr lang="en-GB" smtClean="0"/>
-              <a:t>16/06/2019</a:t>
+              <a:t>29/11/2020</a:t>
             </a:fld>
             <a:endParaRPr lang="en-GB"/>
           </a:p>
@@ -706,7 +703,7 @@
           <a:p>
             <a:fld id="{5683A812-56E3-43DB-839C-3C26450B3226}" type="datetimeFigureOut">
               <a:rPr lang="en-GB" smtClean="0"/>
-              <a:t>16/06/2019</a:t>
+              <a:t>29/11/2020</a:t>
             </a:fld>
             <a:endParaRPr lang="en-GB"/>
           </a:p>
@@ -876,7 +873,7 @@
           <a:p>
             <a:fld id="{5683A812-56E3-43DB-839C-3C26450B3226}" type="datetimeFigureOut">
               <a:rPr lang="en-GB" smtClean="0"/>
-              <a:t>16/06/2019</a:t>
+              <a:t>29/11/2020</a:t>
             </a:fld>
             <a:endParaRPr lang="en-GB"/>
           </a:p>
@@ -1120,7 +1117,7 @@
           <a:p>
             <a:fld id="{5683A812-56E3-43DB-839C-3C26450B3226}" type="datetimeFigureOut">
               <a:rPr lang="en-GB" smtClean="0"/>
-              <a:t>16/06/2019</a:t>
+              <a:t>29/11/2020</a:t>
             </a:fld>
             <a:endParaRPr lang="en-GB"/>
           </a:p>
@@ -1352,7 +1349,7 @@
           <a:p>
             <a:fld id="{5683A812-56E3-43DB-839C-3C26450B3226}" type="datetimeFigureOut">
               <a:rPr lang="en-GB" smtClean="0"/>
-              <a:t>16/06/2019</a:t>
+              <a:t>29/11/2020</a:t>
             </a:fld>
             <a:endParaRPr lang="en-GB"/>
           </a:p>
@@ -1719,7 +1716,7 @@
           <a:p>
             <a:fld id="{5683A812-56E3-43DB-839C-3C26450B3226}" type="datetimeFigureOut">
               <a:rPr lang="en-GB" smtClean="0"/>
-              <a:t>16/06/2019</a:t>
+              <a:t>29/11/2020</a:t>
             </a:fld>
             <a:endParaRPr lang="en-GB"/>
           </a:p>
@@ -1837,7 +1834,7 @@
           <a:p>
             <a:fld id="{5683A812-56E3-43DB-839C-3C26450B3226}" type="datetimeFigureOut">
               <a:rPr lang="en-GB" smtClean="0"/>
-              <a:t>16/06/2019</a:t>
+              <a:t>29/11/2020</a:t>
             </a:fld>
             <a:endParaRPr lang="en-GB"/>
           </a:p>
@@ -1932,7 +1929,7 @@
           <a:p>
             <a:fld id="{5683A812-56E3-43DB-839C-3C26450B3226}" type="datetimeFigureOut">
               <a:rPr lang="en-GB" smtClean="0"/>
-              <a:t>16/06/2019</a:t>
+              <a:t>29/11/2020</a:t>
             </a:fld>
             <a:endParaRPr lang="en-GB"/>
           </a:p>
@@ -2209,7 +2206,7 @@
           <a:p>
             <a:fld id="{5683A812-56E3-43DB-839C-3C26450B3226}" type="datetimeFigureOut">
               <a:rPr lang="en-GB" smtClean="0"/>
-              <a:t>16/06/2019</a:t>
+              <a:t>29/11/2020</a:t>
             </a:fld>
             <a:endParaRPr lang="en-GB"/>
           </a:p>
@@ -2466,7 +2463,7 @@
           <a:p>
             <a:fld id="{5683A812-56E3-43DB-839C-3C26450B3226}" type="datetimeFigureOut">
               <a:rPr lang="en-GB" smtClean="0"/>
-              <a:t>16/06/2019</a:t>
+              <a:t>29/11/2020</a:t>
             </a:fld>
             <a:endParaRPr lang="en-GB"/>
           </a:p>
@@ -2679,7 +2676,7 @@
           <a:p>
             <a:fld id="{5683A812-56E3-43DB-839C-3C26450B3226}" type="datetimeFigureOut">
               <a:rPr lang="en-GB" smtClean="0"/>
-              <a:t>16/06/2019</a:t>
+              <a:t>29/11/2020</a:t>
             </a:fld>
             <a:endParaRPr lang="en-GB"/>
           </a:p>
@@ -4224,52 +4221,6 @@
           </p:sp>
         </p:grpSp>
       </p:grpSp>
-      <p:sp>
-        <p:nvSpPr>
-          <p:cNvPr id="196" name="Rectangle 195">
-            <a:extLst>
-              <a:ext uri="{FF2B5EF4-FFF2-40B4-BE49-F238E27FC236}">
-                <a16:creationId xmlns:a16="http://schemas.microsoft.com/office/drawing/2014/main" id="{07BD8706-7A6B-4447-ACDB-EC978ED043AC}"/>
-              </a:ext>
-            </a:extLst>
-          </p:cNvPr>
-          <p:cNvSpPr/>
-          <p:nvPr/>
-        </p:nvSpPr>
-        <p:spPr>
-          <a:xfrm>
-            <a:off x="13669139" y="232298"/>
-            <a:ext cx="541020" cy="673177"/>
-          </a:xfrm>
-          <a:prstGeom prst="rect">
-            <a:avLst/>
-          </a:prstGeom>
-        </p:spPr>
-        <p:style>
-          <a:lnRef idx="2">
-            <a:schemeClr val="accent1">
-              <a:shade val="50000"/>
-            </a:schemeClr>
-          </a:lnRef>
-          <a:fillRef idx="1">
-            <a:schemeClr val="accent1"/>
-          </a:fillRef>
-          <a:effectRef idx="0">
-            <a:schemeClr val="accent1"/>
-          </a:effectRef>
-          <a:fontRef idx="minor">
-            <a:schemeClr val="lt1"/>
-          </a:fontRef>
-        </p:style>
-        <p:txBody>
-          <a:bodyPr rtlCol="0" anchor="ctr"/>
-          <a:lstStyle/>
-          <a:p>
-            <a:pPr algn="ctr"/>
-            <a:endParaRPr lang="en-GB"/>
-          </a:p>
-        </p:txBody>
-      </p:sp>
       <p:sp>
         <p:nvSpPr>
           <p:cNvPr id="573" name="Rectangle 572">
@@ -24056,6 +24007,100 @@
           </a:fontRef>
         </p:style>
       </p:cxnSp>
+      <p:cxnSp>
+        <p:nvCxnSpPr>
+          <p:cNvPr id="483" name="Straight Connector 482">
+            <a:extLst>
+              <a:ext uri="{FF2B5EF4-FFF2-40B4-BE49-F238E27FC236}">
+                <a16:creationId xmlns:a16="http://schemas.microsoft.com/office/drawing/2014/main" id="{AB95C0E5-5662-472A-8EF0-CFE8B4CD34AF}"/>
+              </a:ext>
+            </a:extLst>
+          </p:cNvPr>
+          <p:cNvCxnSpPr>
+            <a:cxnSpLocks/>
+            <a:endCxn id="543" idx="1"/>
+          </p:cNvCxnSpPr>
+          <p:nvPr/>
+        </p:nvCxnSpPr>
+        <p:spPr>
+          <a:xfrm flipV="1">
+            <a:off x="5593170" y="8125854"/>
+            <a:ext cx="718584" cy="803986"/>
+          </a:xfrm>
+          <a:prstGeom prst="line">
+            <a:avLst/>
+          </a:prstGeom>
+          <a:ln>
+            <a:solidFill>
+              <a:schemeClr val="bg1">
+                <a:lumMod val="50000"/>
+              </a:schemeClr>
+            </a:solidFill>
+            <a:tailEnd type="oval"/>
+          </a:ln>
+        </p:spPr>
+        <p:style>
+          <a:lnRef idx="1">
+            <a:schemeClr val="dk1"/>
+          </a:lnRef>
+          <a:fillRef idx="0">
+            <a:schemeClr val="dk1"/>
+          </a:fillRef>
+          <a:effectRef idx="0">
+            <a:schemeClr val="dk1"/>
+          </a:effectRef>
+          <a:fontRef idx="minor">
+            <a:schemeClr val="tx1"/>
+          </a:fontRef>
+        </p:style>
+      </p:cxnSp>
+      <p:cxnSp>
+        <p:nvCxnSpPr>
+          <p:cNvPr id="485" name="Straight Connector 484">
+            <a:extLst>
+              <a:ext uri="{FF2B5EF4-FFF2-40B4-BE49-F238E27FC236}">
+                <a16:creationId xmlns:a16="http://schemas.microsoft.com/office/drawing/2014/main" id="{F4A04616-4717-469A-834C-6D5592B09A68}"/>
+              </a:ext>
+            </a:extLst>
+          </p:cNvPr>
+          <p:cNvCxnSpPr>
+            <a:cxnSpLocks/>
+            <a:endCxn id="539" idx="2"/>
+          </p:cNvCxnSpPr>
+          <p:nvPr/>
+        </p:nvCxnSpPr>
+        <p:spPr>
+          <a:xfrm flipV="1">
+            <a:off x="5570535" y="8904018"/>
+            <a:ext cx="670758" cy="473706"/>
+          </a:xfrm>
+          <a:prstGeom prst="line">
+            <a:avLst/>
+          </a:prstGeom>
+          <a:ln>
+            <a:solidFill>
+              <a:schemeClr val="bg1">
+                <a:lumMod val="50000"/>
+              </a:schemeClr>
+            </a:solidFill>
+            <a:tailEnd type="oval"/>
+          </a:ln>
+        </p:spPr>
+        <p:style>
+          <a:lnRef idx="1">
+            <a:schemeClr val="dk1"/>
+          </a:lnRef>
+          <a:fillRef idx="0">
+            <a:schemeClr val="dk1"/>
+          </a:fillRef>
+          <a:effectRef idx="0">
+            <a:schemeClr val="dk1"/>
+          </a:effectRef>
+          <a:fontRef idx="minor">
+            <a:schemeClr val="tx1"/>
+          </a:fontRef>
+        </p:style>
+      </p:cxnSp>
     </p:spTree>
     <p:extLst>
       <p:ext uri="{BB962C8B-B14F-4D97-AF65-F5344CB8AC3E}">

</xml_diff>